<commit_message>
Add and Update ppts
</commit_message>
<xml_diff>
--- a/I BELIEVE  我相信.pptx
+++ b/I BELIEVE  我相信.pptx
@@ -5,10 +5,15 @@
     <p:sldMasterId id="2147483660" r:id="rId1"/>
   </p:sldMasterIdLst>
   <p:sldIdLst>
-    <p:sldId id="257" r:id="rId2"/>
-    <p:sldId id="258" r:id="rId3"/>
-    <p:sldId id="259" r:id="rId4"/>
-    <p:sldId id="260" r:id="rId5"/>
+    <p:sldId id="256" r:id="rId2"/>
+    <p:sldId id="257" r:id="rId3"/>
+    <p:sldId id="258" r:id="rId4"/>
+    <p:sldId id="259" r:id="rId5"/>
+    <p:sldId id="260" r:id="rId6"/>
+    <p:sldId id="261" r:id="rId7"/>
+    <p:sldId id="262" r:id="rId8"/>
+    <p:sldId id="263" r:id="rId9"/>
+    <p:sldId id="264" r:id="rId10"/>
   </p:sldIdLst>
   <p:sldSz cx="12192000" cy="6858000"/>
   <p:notesSz cx="6858000" cy="9144000"/>
@@ -107,6 +112,11 @@
       </a:defRPr>
     </a:lvl9pPr>
   </p:defaultTextStyle>
+  <p:extLst>
+    <p:ext uri="{EFAFB233-063F-42B5-8137-9DF3F51BA10A}">
+      <p15:sldGuideLst xmlns:p15="http://schemas.microsoft.com/office/powerpoint/2012/main"/>
+    </p:ext>
+  </p:extLst>
 </p:presentation>
 </file>
 
@@ -291,7 +301,7 @@
           <a:p>
             <a:fld id="{090CCC6F-0312-4C40-BA63-6262FD2D39CE}" type="datetimeFigureOut">
               <a:rPr lang="vi-VN" smtClean="0"/>
-              <a:t>21/08/2020</a:t>
+              <a:t>07/11/2020</a:t>
             </a:fld>
             <a:endParaRPr lang="vi-VN"/>
           </a:p>
@@ -461,7 +471,7 @@
           <a:p>
             <a:fld id="{090CCC6F-0312-4C40-BA63-6262FD2D39CE}" type="datetimeFigureOut">
               <a:rPr lang="vi-VN" smtClean="0"/>
-              <a:t>21/08/2020</a:t>
+              <a:t>07/11/2020</a:t>
             </a:fld>
             <a:endParaRPr lang="vi-VN"/>
           </a:p>
@@ -641,7 +651,7 @@
           <a:p>
             <a:fld id="{090CCC6F-0312-4C40-BA63-6262FD2D39CE}" type="datetimeFigureOut">
               <a:rPr lang="vi-VN" smtClean="0"/>
-              <a:t>21/08/2020</a:t>
+              <a:t>07/11/2020</a:t>
             </a:fld>
             <a:endParaRPr lang="vi-VN"/>
           </a:p>
@@ -811,7 +821,7 @@
           <a:p>
             <a:fld id="{090CCC6F-0312-4C40-BA63-6262FD2D39CE}" type="datetimeFigureOut">
               <a:rPr lang="vi-VN" smtClean="0"/>
-              <a:t>21/08/2020</a:t>
+              <a:t>07/11/2020</a:t>
             </a:fld>
             <a:endParaRPr lang="vi-VN"/>
           </a:p>
@@ -1057,7 +1067,7 @@
           <a:p>
             <a:fld id="{090CCC6F-0312-4C40-BA63-6262FD2D39CE}" type="datetimeFigureOut">
               <a:rPr lang="vi-VN" smtClean="0"/>
-              <a:t>21/08/2020</a:t>
+              <a:t>07/11/2020</a:t>
             </a:fld>
             <a:endParaRPr lang="vi-VN"/>
           </a:p>
@@ -1345,7 +1355,7 @@
           <a:p>
             <a:fld id="{090CCC6F-0312-4C40-BA63-6262FD2D39CE}" type="datetimeFigureOut">
               <a:rPr lang="vi-VN" smtClean="0"/>
-              <a:t>21/08/2020</a:t>
+              <a:t>07/11/2020</a:t>
             </a:fld>
             <a:endParaRPr lang="vi-VN"/>
           </a:p>
@@ -1767,7 +1777,7 @@
           <a:p>
             <a:fld id="{090CCC6F-0312-4C40-BA63-6262FD2D39CE}" type="datetimeFigureOut">
               <a:rPr lang="vi-VN" smtClean="0"/>
-              <a:t>21/08/2020</a:t>
+              <a:t>07/11/2020</a:t>
             </a:fld>
             <a:endParaRPr lang="vi-VN"/>
           </a:p>
@@ -1885,7 +1895,7 @@
           <a:p>
             <a:fld id="{090CCC6F-0312-4C40-BA63-6262FD2D39CE}" type="datetimeFigureOut">
               <a:rPr lang="vi-VN" smtClean="0"/>
-              <a:t>21/08/2020</a:t>
+              <a:t>07/11/2020</a:t>
             </a:fld>
             <a:endParaRPr lang="vi-VN"/>
           </a:p>
@@ -1980,7 +1990,7 @@
           <a:p>
             <a:fld id="{090CCC6F-0312-4C40-BA63-6262FD2D39CE}" type="datetimeFigureOut">
               <a:rPr lang="vi-VN" smtClean="0"/>
-              <a:t>21/08/2020</a:t>
+              <a:t>07/11/2020</a:t>
             </a:fld>
             <a:endParaRPr lang="vi-VN"/>
           </a:p>
@@ -2257,7 +2267,7 @@
           <a:p>
             <a:fld id="{090CCC6F-0312-4C40-BA63-6262FD2D39CE}" type="datetimeFigureOut">
               <a:rPr lang="vi-VN" smtClean="0"/>
-              <a:t>21/08/2020</a:t>
+              <a:t>07/11/2020</a:t>
             </a:fld>
             <a:endParaRPr lang="vi-VN"/>
           </a:p>
@@ -2514,7 +2524,7 @@
           <a:p>
             <a:fld id="{090CCC6F-0312-4C40-BA63-6262FD2D39CE}" type="datetimeFigureOut">
               <a:rPr lang="vi-VN" smtClean="0"/>
-              <a:t>21/08/2020</a:t>
+              <a:t>07/11/2020</a:t>
             </a:fld>
             <a:endParaRPr lang="vi-VN"/>
           </a:p>
@@ -2732,7 +2742,7 @@
           <a:p>
             <a:fld id="{090CCC6F-0312-4C40-BA63-6262FD2D39CE}" type="datetimeFigureOut">
               <a:rPr lang="vi-VN" smtClean="0"/>
-              <a:t>21/08/2020</a:t>
+              <a:t>07/11/2020</a:t>
             </a:fld>
             <a:endParaRPr lang="vi-VN"/>
           </a:p>
@@ -3109,7 +3119,7 @@
       </p:grpSpPr>
       <p:sp>
         <p:nvSpPr>
-          <p:cNvPr id="2" name="Title 1"/>
+          <p:cNvPr id="4" name="標題 3"/>
           <p:cNvSpPr>
             <a:spLocks noGrp="1"/>
           </p:cNvSpPr>
@@ -3117,172 +3127,99 @@
             <p:ph type="title"/>
           </p:nvPr>
         </p:nvSpPr>
-        <p:spPr/>
+        <p:spPr>
+          <a:xfrm>
+            <a:off x="0" y="2857513"/>
+            <a:ext cx="12192000" cy="1143000"/>
+          </a:xfrm>
+        </p:spPr>
         <p:txBody>
           <a:bodyPr>
-            <a:normAutofit/>
+            <a:noAutofit/>
           </a:bodyPr>
           <a:lstStyle/>
           <a:p>
             <a:r>
-              <a:rPr lang="vi-VN" sz="4800" b="1" cap="all" dirty="0">
+              <a:rPr lang="vi-VN" b="1" i="1" dirty="0" smtClean="0">
+                <a:solidFill>
+                  <a:srgbClr val="000066"/>
+                </a:solidFill>
+                <a:effectLst>
+                  <a:outerShdw blurRad="38100" dist="38100" dir="2700000" algn="tl">
+                    <a:srgbClr val="000000">
+                      <a:alpha val="43137"/>
+                    </a:srgbClr>
+                  </a:outerShdw>
+                </a:effectLst>
                 <a:latin typeface="+mn-lt"/>
-                <a:ea typeface="Microsoft JhengHei" panose="020B0604030504040204" pitchFamily="34" charset="-120"/>
+                <a:ea typeface="微軟正黑體" pitchFamily="34" charset="-120"/>
               </a:rPr>
               <a:t>I </a:t>
             </a:r>
             <a:r>
-              <a:rPr lang="vi-VN" sz="4800" b="1" cap="all" dirty="0" smtClean="0">
+              <a:rPr lang="vi-VN" b="1" i="1" dirty="0">
+                <a:solidFill>
+                  <a:srgbClr val="000066"/>
+                </a:solidFill>
+                <a:effectLst>
+                  <a:outerShdw blurRad="38100" dist="38100" dir="2700000" algn="tl">
+                    <a:srgbClr val="000000">
+                      <a:alpha val="43137"/>
+                    </a:srgbClr>
+                  </a:outerShdw>
+                </a:effectLst>
                 <a:latin typeface="+mn-lt"/>
-                <a:ea typeface="Microsoft JhengHei" panose="020B0604030504040204" pitchFamily="34" charset="-120"/>
+                <a:ea typeface="微軟正黑體" pitchFamily="34" charset="-120"/>
               </a:rPr>
-              <a:t>BELIEVE</a:t>
-            </a:r>
-            <a:r>
-              <a:rPr lang="vi-VN" sz="4800" b="1" cap="all" dirty="0" smtClean="0">
-                <a:ea typeface="Microsoft JhengHei" panose="020B0604030504040204" pitchFamily="34" charset="-120"/>
-              </a:rPr>
-              <a:t> </a:t>
-            </a:r>
-            <a:r>
-              <a:rPr lang="en-US" sz="4800" b="1" cap="all" dirty="0" smtClean="0">
-                <a:latin typeface="Microsoft JhengHei" panose="020B0604030504040204" pitchFamily="34" charset="-120"/>
-                <a:ea typeface="Microsoft JhengHei" panose="020B0604030504040204" pitchFamily="34" charset="-120"/>
-              </a:rPr>
-              <a:t> </a:t>
-            </a:r>
-            <a:r>
-              <a:rPr lang="zh-CN" altLang="en-US" sz="4800" b="1" cap="all" dirty="0" smtClean="0">
-                <a:latin typeface="Microsoft JhengHei" panose="020B0604030504040204" pitchFamily="34" charset="-120"/>
-                <a:ea typeface="Microsoft JhengHei" panose="020B0604030504040204" pitchFamily="34" charset="-120"/>
-              </a:rPr>
-              <a:t>我相信</a:t>
-            </a:r>
-            <a:endParaRPr lang="vi-VN" sz="4800" b="1" dirty="0">
-              <a:ea typeface="Microsoft JhengHei" panose="020B0604030504040204" pitchFamily="34" charset="-120"/>
-            </a:endParaRPr>
-          </a:p>
-        </p:txBody>
-      </p:sp>
-      <p:sp>
-        <p:nvSpPr>
-          <p:cNvPr id="3" name="Content Placeholder 2"/>
-          <p:cNvSpPr>
-            <a:spLocks noGrp="1"/>
-          </p:cNvSpPr>
-          <p:nvPr>
-            <p:ph idx="1"/>
-          </p:nvPr>
-        </p:nvSpPr>
-        <p:spPr/>
-        <p:txBody>
-          <a:bodyPr>
-            <a:normAutofit/>
-          </a:bodyPr>
-          <a:lstStyle/>
-          <a:p>
-            <a:pPr marL="0" indent="0" algn="ctr">
-              <a:buNone/>
-            </a:pPr>
-            <a:r>
-              <a:rPr lang="zh-TW" altLang="en-US" sz="5400" b="1" dirty="0">
-                <a:latin typeface="Microsoft JhengHei" panose="020B0604030504040204" pitchFamily="34" charset="-120"/>
-                <a:ea typeface="Microsoft JhengHei" panose="020B0604030504040204" pitchFamily="34" charset="-120"/>
-              </a:rPr>
-              <a:t>我相信天父創造世</a:t>
-            </a:r>
-            <a:r>
-              <a:rPr lang="zh-TW" altLang="en-US" sz="5400" b="1" dirty="0" smtClean="0">
-                <a:latin typeface="Microsoft JhengHei" panose="020B0604030504040204" pitchFamily="34" charset="-120"/>
-                <a:ea typeface="Microsoft JhengHei" panose="020B0604030504040204" pitchFamily="34" charset="-120"/>
-              </a:rPr>
-              <a:t>界</a:t>
-            </a:r>
-            <a:endParaRPr lang="en-US" altLang="zh-TW" sz="5400" b="1" dirty="0" smtClean="0">
-              <a:latin typeface="Microsoft JhengHei" panose="020B0604030504040204" pitchFamily="34" charset="-120"/>
-              <a:ea typeface="Microsoft JhengHei" panose="020B0604030504040204" pitchFamily="34" charset="-120"/>
-            </a:endParaRPr>
-          </a:p>
-          <a:p>
-            <a:pPr marL="0" indent="0" algn="ctr">
-              <a:buNone/>
-            </a:pPr>
-            <a:r>
-              <a:rPr lang="zh-TW" altLang="en-US" sz="5400" b="1" dirty="0" smtClean="0">
-                <a:latin typeface="Microsoft JhengHei" panose="020B0604030504040204" pitchFamily="34" charset="-120"/>
-                <a:ea typeface="Microsoft JhengHei" panose="020B0604030504040204" pitchFamily="34" charset="-120"/>
+              <a:t>BELIEVE </a:t>
+            </a:r>
+            <a:r>
+              <a:rPr lang="zh-CN" altLang="en-US" sz="7200" b="1" i="1" dirty="0">
+                <a:solidFill>
+                  <a:srgbClr val="000066"/>
+                </a:solidFill>
+                <a:effectLst>
+                  <a:outerShdw blurRad="38100" dist="38100" dir="2700000" algn="tl">
+                    <a:srgbClr val="000000">
+                      <a:alpha val="43137"/>
+                    </a:srgbClr>
+                  </a:outerShdw>
+                </a:effectLst>
+                <a:latin typeface="微軟正黑體" pitchFamily="34" charset="-120"/>
+                <a:ea typeface="微軟正黑體" pitchFamily="34" charset="-120"/>
               </a:rPr>
               <a:t>我</a:t>
             </a:r>
             <a:r>
-              <a:rPr lang="zh-TW" altLang="en-US" sz="5400" b="1" dirty="0">
-                <a:latin typeface="Microsoft JhengHei" panose="020B0604030504040204" pitchFamily="34" charset="-120"/>
-                <a:ea typeface="Microsoft JhengHei" panose="020B0604030504040204" pitchFamily="34" charset="-120"/>
+              <a:rPr lang="zh-CN" altLang="en-US" sz="7200" b="1" i="1" dirty="0">
+                <a:solidFill>
+                  <a:srgbClr val="000066"/>
+                </a:solidFill>
+                <a:effectLst>
+                  <a:outerShdw blurRad="38100" dist="38100" dir="2700000" algn="tl">
+                    <a:srgbClr val="000000">
+                      <a:alpha val="43137"/>
+                    </a:srgbClr>
+                  </a:outerShdw>
+                </a:effectLst>
+                <a:latin typeface="微軟正黑體" pitchFamily="34" charset="-120"/>
+                <a:ea typeface="微軟正黑體" pitchFamily="34" charset="-120"/>
               </a:rPr>
-              <a:t>相信耶穌死裡復</a:t>
-            </a:r>
-            <a:r>
-              <a:rPr lang="zh-TW" altLang="en-US" sz="5400" b="1" dirty="0" smtClean="0">
-                <a:latin typeface="Microsoft JhengHei" panose="020B0604030504040204" pitchFamily="34" charset="-120"/>
-                <a:ea typeface="Microsoft JhengHei" panose="020B0604030504040204" pitchFamily="34" charset="-120"/>
-              </a:rPr>
-              <a:t>活</a:t>
-            </a:r>
-            <a:endParaRPr lang="en-US" altLang="zh-TW" sz="5400" b="1" dirty="0" smtClean="0">
-              <a:latin typeface="Microsoft JhengHei" panose="020B0604030504040204" pitchFamily="34" charset="-120"/>
-              <a:ea typeface="Microsoft JhengHei" panose="020B0604030504040204" pitchFamily="34" charset="-120"/>
-            </a:endParaRPr>
-          </a:p>
-          <a:p>
-            <a:pPr marL="0" indent="0" algn="ctr">
-              <a:buNone/>
-            </a:pPr>
-            <a:r>
-              <a:rPr lang="zh-TW" altLang="en-US" sz="5400" b="1" dirty="0" smtClean="0">
-                <a:latin typeface="Microsoft JhengHei" panose="020B0604030504040204" pitchFamily="34" charset="-120"/>
-                <a:ea typeface="Microsoft JhengHei" panose="020B0604030504040204" pitchFamily="34" charset="-120"/>
-              </a:rPr>
-              <a:t>我</a:t>
-            </a:r>
-            <a:r>
-              <a:rPr lang="zh-TW" altLang="en-US" sz="5400" b="1" dirty="0">
-                <a:latin typeface="Microsoft JhengHei" panose="020B0604030504040204" pitchFamily="34" charset="-120"/>
-                <a:ea typeface="Microsoft JhengHei" panose="020B0604030504040204" pitchFamily="34" charset="-120"/>
-              </a:rPr>
-              <a:t>相信聖靈住在我</a:t>
-            </a:r>
-            <a:r>
-              <a:rPr lang="zh-TW" altLang="en-US" sz="5400" b="1" dirty="0" smtClean="0">
-                <a:latin typeface="Microsoft JhengHei" panose="020B0604030504040204" pitchFamily="34" charset="-120"/>
-                <a:ea typeface="Microsoft JhengHei" panose="020B0604030504040204" pitchFamily="34" charset="-120"/>
-              </a:rPr>
-              <a:t>心</a:t>
-            </a:r>
-            <a:endParaRPr lang="en-US" altLang="zh-TW" sz="5400" b="1" dirty="0" smtClean="0">
-              <a:latin typeface="Microsoft JhengHei" panose="020B0604030504040204" pitchFamily="34" charset="-120"/>
-              <a:ea typeface="Microsoft JhengHei" panose="020B0604030504040204" pitchFamily="34" charset="-120"/>
-            </a:endParaRPr>
-          </a:p>
-          <a:p>
-            <a:pPr marL="0" indent="0" algn="ctr">
-              <a:buNone/>
-            </a:pPr>
-            <a:r>
-              <a:rPr lang="zh-TW" altLang="en-US" sz="5400" b="1" dirty="0" smtClean="0">
-                <a:latin typeface="Microsoft JhengHei" panose="020B0604030504040204" pitchFamily="34" charset="-120"/>
-                <a:ea typeface="Microsoft JhengHei" panose="020B0604030504040204" pitchFamily="34" charset="-120"/>
-              </a:rPr>
-              <a:t>賜</a:t>
-            </a:r>
-            <a:r>
-              <a:rPr lang="zh-TW" altLang="en-US" sz="5400" b="1" dirty="0">
-                <a:latin typeface="Microsoft JhengHei" panose="020B0604030504040204" pitchFamily="34" charset="-120"/>
-                <a:ea typeface="Microsoft JhengHei" panose="020B0604030504040204" pitchFamily="34" charset="-120"/>
-              </a:rPr>
-              <a:t>給我寶貴極大能力</a:t>
-            </a:r>
-            <a:endParaRPr lang="vi-VN" sz="5400" b="1" dirty="0">
-              <a:ea typeface="Microsoft JhengHei" panose="020B0604030504040204" pitchFamily="34" charset="-120"/>
+              <a:t>相信</a:t>
+            </a:r>
+            <a:endParaRPr lang="zh-TW" altLang="en-US" sz="7200" b="1" i="1" dirty="0">
+              <a:solidFill>
+                <a:srgbClr val="000066"/>
+              </a:solidFill>
+              <a:effectLst>
+                <a:outerShdw blurRad="38100" dist="38100" dir="2700000" algn="tl">
+                  <a:srgbClr val="000000">
+                    <a:alpha val="43137"/>
+                  </a:srgbClr>
+                </a:outerShdw>
+              </a:effectLst>
+              <a:latin typeface="微軟正黑體" pitchFamily="34" charset="-120"/>
+              <a:ea typeface="微軟正黑體" pitchFamily="34" charset="-120"/>
             </a:endParaRPr>
           </a:p>
         </p:txBody>
@@ -3290,7 +3227,7 @@
     </p:spTree>
     <p:extLst>
       <p:ext uri="{BB962C8B-B14F-4D97-AF65-F5344CB8AC3E}">
-        <p14:creationId xmlns:p14="http://schemas.microsoft.com/office/powerpoint/2010/main" val="1744207796"/>
+        <p14:creationId xmlns:p14="http://schemas.microsoft.com/office/powerpoint/2010/main" val="1018809159"/>
       </p:ext>
     </p:extLst>
   </p:cSld>
@@ -3319,250 +3256,75 @@
       </p:grpSpPr>
       <p:sp>
         <p:nvSpPr>
-          <p:cNvPr id="2" name="Title 1"/>
-          <p:cNvSpPr>
-            <a:spLocks noGrp="1"/>
-          </p:cNvSpPr>
-          <p:nvPr>
-            <p:ph type="title"/>
-          </p:nvPr>
-        </p:nvSpPr>
-        <p:spPr/>
-        <p:txBody>
-          <a:bodyPr>
+          <p:cNvPr id="5" name="內容版面配置區 4"/>
+          <p:cNvSpPr>
+            <a:spLocks noGrp="1"/>
+          </p:cNvSpPr>
+          <p:nvPr>
+            <p:ph idx="1"/>
+          </p:nvPr>
+        </p:nvSpPr>
+        <p:spPr>
+          <a:xfrm>
+            <a:off x="0" y="2084851"/>
+            <a:ext cx="12192000" cy="2404863"/>
+          </a:xfrm>
+        </p:spPr>
+        <p:txBody>
+          <a:bodyPr anchor="ctr">
             <a:normAutofit/>
           </a:bodyPr>
           <a:lstStyle/>
           <a:p>
-            <a:r>
-              <a:rPr lang="vi-VN" sz="4800" b="1" cap="all" dirty="0">
-                <a:latin typeface="+mn-lt"/>
-                <a:ea typeface="Microsoft JhengHei" panose="020B0604030504040204" pitchFamily="34" charset="-120"/>
-              </a:rPr>
-              <a:t>I </a:t>
-            </a:r>
-            <a:r>
-              <a:rPr lang="vi-VN" sz="4800" b="1" cap="all" dirty="0" smtClean="0">
-                <a:latin typeface="+mn-lt"/>
-                <a:ea typeface="Microsoft JhengHei" panose="020B0604030504040204" pitchFamily="34" charset="-120"/>
-              </a:rPr>
-              <a:t>BELIEVE</a:t>
-            </a:r>
-            <a:r>
-              <a:rPr lang="vi-VN" sz="4800" b="1" cap="all" dirty="0" smtClean="0">
-                <a:ea typeface="Microsoft JhengHei" panose="020B0604030504040204" pitchFamily="34" charset="-120"/>
-              </a:rPr>
-              <a:t> </a:t>
-            </a:r>
-            <a:r>
-              <a:rPr lang="en-US" sz="4800" b="1" cap="all" dirty="0" smtClean="0">
+            <a:pPr marL="0" indent="0" algn="ctr">
+              <a:buNone/>
+            </a:pPr>
+            <a:r>
+              <a:rPr lang="zh-TW" altLang="en-US" sz="6400" b="1" dirty="0">
+                <a:solidFill>
+                  <a:srgbClr val="000066"/>
+                </a:solidFill>
                 <a:latin typeface="Microsoft JhengHei" panose="020B0604030504040204" pitchFamily="34" charset="-120"/>
                 <a:ea typeface="Microsoft JhengHei" panose="020B0604030504040204" pitchFamily="34" charset="-120"/>
               </a:rPr>
-              <a:t> </a:t>
-            </a:r>
-            <a:r>
-              <a:rPr lang="zh-CN" altLang="en-US" sz="4800" b="1" cap="all" dirty="0" smtClean="0">
+              <a:t>我相信天父創造世界</a:t>
+            </a:r>
+            <a:endParaRPr lang="en-US" altLang="zh-TW" sz="6400" b="1" dirty="0">
+              <a:solidFill>
+                <a:srgbClr val="000066"/>
+              </a:solidFill>
+              <a:latin typeface="Microsoft JhengHei" panose="020B0604030504040204" pitchFamily="34" charset="-120"/>
+              <a:ea typeface="Microsoft JhengHei" panose="020B0604030504040204" pitchFamily="34" charset="-120"/>
+            </a:endParaRPr>
+          </a:p>
+          <a:p>
+            <a:pPr marL="0" indent="0" algn="ctr">
+              <a:buNone/>
+            </a:pPr>
+            <a:r>
+              <a:rPr lang="zh-TW" altLang="en-US" sz="6400" b="1" dirty="0">
+                <a:solidFill>
+                  <a:srgbClr val="000066"/>
+                </a:solidFill>
                 <a:latin typeface="Microsoft JhengHei" panose="020B0604030504040204" pitchFamily="34" charset="-120"/>
                 <a:ea typeface="Microsoft JhengHei" panose="020B0604030504040204" pitchFamily="34" charset="-120"/>
               </a:rPr>
-              <a:t>我相信</a:t>
-            </a:r>
-            <a:endParaRPr lang="vi-VN" sz="4800" b="1" dirty="0">
-              <a:ea typeface="Microsoft JhengHei" panose="020B0604030504040204" pitchFamily="34" charset="-120"/>
-            </a:endParaRPr>
-          </a:p>
-        </p:txBody>
-      </p:sp>
-      <p:sp>
-        <p:nvSpPr>
-          <p:cNvPr id="3" name="Content Placeholder 2"/>
-          <p:cNvSpPr>
-            <a:spLocks noGrp="1"/>
-          </p:cNvSpPr>
-          <p:nvPr>
-            <p:ph idx="1"/>
-          </p:nvPr>
-        </p:nvSpPr>
-        <p:spPr/>
-        <p:txBody>
-          <a:bodyPr>
-            <a:normAutofit/>
-          </a:bodyPr>
-          <a:lstStyle/>
-          <a:p>
-            <a:pPr marL="0" indent="0" algn="ctr">
-              <a:buNone/>
-            </a:pPr>
-            <a:r>
-              <a:rPr lang="en-US" altLang="zh-TW" sz="5400" b="1" dirty="0">
-                <a:ea typeface="Microsoft JhengHei" panose="020B0604030504040204" pitchFamily="34" charset="-120"/>
-              </a:rPr>
-              <a:t>I </a:t>
-            </a:r>
-            <a:r>
-              <a:rPr lang="en-US" altLang="zh-TW" sz="5400" b="1" dirty="0">
-                <a:ea typeface="Microsoft JhengHei" panose="020B0604030504040204" pitchFamily="34" charset="-120"/>
-              </a:rPr>
-              <a:t>believe</a:t>
-            </a:r>
-            <a:r>
-              <a:rPr lang="vi-VN" altLang="zh-TW" sz="5400" b="1" dirty="0">
-                <a:latin typeface="Microsoft JhengHei" panose="020B0604030504040204" pitchFamily="34" charset="-120"/>
-                <a:ea typeface="Microsoft JhengHei" panose="020B0604030504040204" pitchFamily="34" charset="-120"/>
-              </a:rPr>
-              <a:t> </a:t>
-            </a:r>
-            <a:r>
-              <a:rPr lang="vi-VN" altLang="zh-TW" sz="5400" b="1" dirty="0">
-                <a:latin typeface="Microsoft JhengHei" panose="020B0604030504040204" pitchFamily="34" charset="-120"/>
-                <a:ea typeface="Microsoft JhengHei" panose="020B0604030504040204" pitchFamily="34" charset="-120"/>
-              </a:rPr>
-              <a:t> </a:t>
-            </a:r>
-            <a:r>
-              <a:rPr lang="zh-TW" altLang="en-US" sz="5400" b="1" dirty="0">
-                <a:latin typeface="Microsoft JhengHei" panose="020B0604030504040204" pitchFamily="34" charset="-120"/>
-                <a:ea typeface="Microsoft JhengHei" panose="020B0604030504040204" pitchFamily="34" charset="-120"/>
-              </a:rPr>
-              <a:t>我</a:t>
-            </a:r>
-            <a:r>
-              <a:rPr lang="zh-TW" altLang="en-US" sz="5400" b="1" dirty="0">
-                <a:latin typeface="Microsoft JhengHei" panose="020B0604030504040204" pitchFamily="34" charset="-120"/>
-                <a:ea typeface="Microsoft JhengHei" panose="020B0604030504040204" pitchFamily="34" charset="-120"/>
-              </a:rPr>
-              <a:t>相信耶穌是真</a:t>
-            </a:r>
-            <a:r>
-              <a:rPr lang="zh-TW" altLang="en-US" sz="5400" b="1" dirty="0">
-                <a:latin typeface="Microsoft JhengHei" panose="020B0604030504040204" pitchFamily="34" charset="-120"/>
-                <a:ea typeface="Microsoft JhengHei" panose="020B0604030504040204" pitchFamily="34" charset="-120"/>
-              </a:rPr>
-              <a:t>神</a:t>
-            </a:r>
-            <a:endParaRPr lang="vi-VN" altLang="zh-TW" sz="5400" b="1" dirty="0">
+              <a:t>我相信耶穌死裡復活</a:t>
+            </a:r>
+            <a:endParaRPr lang="en-US" altLang="zh-TW" sz="6400" b="1" dirty="0">
+              <a:solidFill>
+                <a:srgbClr val="000066"/>
+              </a:solidFill>
               <a:latin typeface="Microsoft JhengHei" panose="020B0604030504040204" pitchFamily="34" charset="-120"/>
               <a:ea typeface="Microsoft JhengHei" panose="020B0604030504040204" pitchFamily="34" charset="-120"/>
             </a:endParaRPr>
           </a:p>
-          <a:p>
-            <a:pPr marL="0" indent="0" algn="ctr">
-              <a:buNone/>
-            </a:pPr>
-            <a:r>
-              <a:rPr lang="zh-TW" altLang="en-US" sz="5400" b="1" dirty="0">
-                <a:latin typeface="Microsoft JhengHei" panose="020B0604030504040204" pitchFamily="34" charset="-120"/>
-                <a:ea typeface="Microsoft JhengHei" panose="020B0604030504040204" pitchFamily="34" charset="-120"/>
-              </a:rPr>
-              <a:t>永</a:t>
-            </a:r>
-            <a:r>
-              <a:rPr lang="zh-TW" altLang="en-US" sz="5400" b="1" dirty="0">
-                <a:latin typeface="Microsoft JhengHei" panose="020B0604030504040204" pitchFamily="34" charset="-120"/>
-                <a:ea typeface="Microsoft JhengHei" panose="020B0604030504040204" pitchFamily="34" charset="-120"/>
-              </a:rPr>
-              <a:t>遠得勝君</a:t>
-            </a:r>
-            <a:r>
-              <a:rPr lang="zh-TW" altLang="en-US" sz="5400" b="1" dirty="0">
-                <a:latin typeface="Microsoft JhengHei" panose="020B0604030504040204" pitchFamily="34" charset="-120"/>
-                <a:ea typeface="Microsoft JhengHei" panose="020B0604030504040204" pitchFamily="34" charset="-120"/>
-              </a:rPr>
-              <a:t>王</a:t>
-            </a:r>
-            <a:endParaRPr lang="vi-VN" altLang="zh-TW" sz="5400" b="1" dirty="0">
-              <a:latin typeface="Microsoft JhengHei" panose="020B0604030504040204" pitchFamily="34" charset="-120"/>
-              <a:ea typeface="Microsoft JhengHei" panose="020B0604030504040204" pitchFamily="34" charset="-120"/>
-            </a:endParaRPr>
-          </a:p>
-          <a:p>
-            <a:pPr marL="0" indent="0" algn="ctr">
-              <a:buNone/>
-            </a:pPr>
-            <a:r>
-              <a:rPr lang="zh-TW" altLang="en-US" sz="5400" b="1" dirty="0">
-                <a:latin typeface="Microsoft JhengHei" panose="020B0604030504040204" pitchFamily="34" charset="-120"/>
-                <a:ea typeface="Microsoft JhengHei" panose="020B0604030504040204" pitchFamily="34" charset="-120"/>
-              </a:rPr>
-              <a:t>我</a:t>
-            </a:r>
-            <a:r>
-              <a:rPr lang="zh-TW" altLang="en-US" sz="5400" b="1" dirty="0">
-                <a:latin typeface="Microsoft JhengHei" panose="020B0604030504040204" pitchFamily="34" charset="-120"/>
-                <a:ea typeface="Microsoft JhengHei" panose="020B0604030504040204" pitchFamily="34" charset="-120"/>
-              </a:rPr>
-              <a:t>敬</a:t>
-            </a:r>
-            <a:r>
-              <a:rPr lang="zh-TW" altLang="en-US" sz="5400" b="1" dirty="0">
-                <a:latin typeface="Microsoft JhengHei" panose="020B0604030504040204" pitchFamily="34" charset="-120"/>
-                <a:ea typeface="Microsoft JhengHei" panose="020B0604030504040204" pitchFamily="34" charset="-120"/>
-              </a:rPr>
-              <a:t>拜</a:t>
-            </a:r>
-            <a:r>
-              <a:rPr lang="vi-VN" altLang="zh-TW" sz="5400" b="1" dirty="0">
-                <a:latin typeface="Microsoft JhengHei" panose="020B0604030504040204" pitchFamily="34" charset="-120"/>
-                <a:ea typeface="Microsoft JhengHei" panose="020B0604030504040204" pitchFamily="34" charset="-120"/>
-              </a:rPr>
-              <a:t>  </a:t>
-            </a:r>
-            <a:r>
-              <a:rPr lang="zh-TW" altLang="en-US" sz="5400" b="1" dirty="0">
-                <a:latin typeface="Microsoft JhengHei" panose="020B0604030504040204" pitchFamily="34" charset="-120"/>
-                <a:ea typeface="Microsoft JhengHei" panose="020B0604030504040204" pitchFamily="34" charset="-120"/>
-              </a:rPr>
-              <a:t>高</a:t>
-            </a:r>
-            <a:r>
-              <a:rPr lang="zh-TW" altLang="en-US" sz="5400" b="1" dirty="0">
-                <a:latin typeface="Microsoft JhengHei" panose="020B0604030504040204" pitchFamily="34" charset="-120"/>
-                <a:ea typeface="Microsoft JhengHei" panose="020B0604030504040204" pitchFamily="34" charset="-120"/>
-              </a:rPr>
-              <a:t>舉耶穌基督的</a:t>
-            </a:r>
-            <a:r>
-              <a:rPr lang="zh-TW" altLang="en-US" sz="5400" b="1" dirty="0">
-                <a:latin typeface="Microsoft JhengHei" panose="020B0604030504040204" pitchFamily="34" charset="-120"/>
-                <a:ea typeface="Microsoft JhengHei" panose="020B0604030504040204" pitchFamily="34" charset="-120"/>
-              </a:rPr>
-              <a:t>名</a:t>
-            </a:r>
-            <a:endParaRPr lang="vi-VN" altLang="zh-TW" sz="5400" b="1" dirty="0">
-              <a:latin typeface="Microsoft JhengHei" panose="020B0604030504040204" pitchFamily="34" charset="-120"/>
-              <a:ea typeface="Microsoft JhengHei" panose="020B0604030504040204" pitchFamily="34" charset="-120"/>
-            </a:endParaRPr>
-          </a:p>
-          <a:p>
-            <a:pPr marL="0" indent="0" algn="ctr">
-              <a:buNone/>
-            </a:pPr>
-            <a:r>
-              <a:rPr lang="zh-TW" altLang="en-US" sz="5400" b="1" dirty="0">
-                <a:latin typeface="Microsoft JhengHei" panose="020B0604030504040204" pitchFamily="34" charset="-120"/>
-                <a:ea typeface="Microsoft JhengHei" panose="020B0604030504040204" pitchFamily="34" charset="-120"/>
-              </a:rPr>
-              <a:t>超</a:t>
-            </a:r>
-            <a:r>
-              <a:rPr lang="zh-TW" altLang="en-US" sz="5400" b="1" dirty="0">
-                <a:latin typeface="Microsoft JhengHei" panose="020B0604030504040204" pitchFamily="34" charset="-120"/>
-                <a:ea typeface="Microsoft JhengHei" panose="020B0604030504040204" pitchFamily="34" charset="-120"/>
-              </a:rPr>
-              <a:t>乎萬名之上的名</a:t>
-            </a:r>
-            <a:endParaRPr lang="vi-VN" sz="5400" b="1" dirty="0">
-              <a:latin typeface="Microsoft JhengHei" panose="020B0604030504040204" pitchFamily="34" charset="-120"/>
-              <a:ea typeface="Microsoft JhengHei" panose="020B0604030504040204" pitchFamily="34" charset="-120"/>
-            </a:endParaRPr>
-          </a:p>
         </p:txBody>
       </p:sp>
     </p:spTree>
     <p:extLst>
       <p:ext uri="{BB962C8B-B14F-4D97-AF65-F5344CB8AC3E}">
-        <p14:creationId xmlns:p14="http://schemas.microsoft.com/office/powerpoint/2010/main" val="1104815615"/>
+        <p14:creationId xmlns:p14="http://schemas.microsoft.com/office/powerpoint/2010/main" val="711721610"/>
       </p:ext>
     </p:extLst>
   </p:cSld>
@@ -3591,213 +3353,65 @@
       </p:grpSpPr>
       <p:sp>
         <p:nvSpPr>
-          <p:cNvPr id="2" name="Title 1"/>
-          <p:cNvSpPr>
-            <a:spLocks noGrp="1"/>
-          </p:cNvSpPr>
-          <p:nvPr>
-            <p:ph type="title"/>
-          </p:nvPr>
-        </p:nvSpPr>
-        <p:spPr/>
-        <p:txBody>
-          <a:bodyPr>
+          <p:cNvPr id="5" name="內容版面配置區 4"/>
+          <p:cNvSpPr>
+            <a:spLocks noGrp="1"/>
+          </p:cNvSpPr>
+          <p:nvPr>
+            <p:ph idx="1"/>
+          </p:nvPr>
+        </p:nvSpPr>
+        <p:spPr>
+          <a:xfrm>
+            <a:off x="0" y="2084851"/>
+            <a:ext cx="12192000" cy="2404863"/>
+          </a:xfrm>
+        </p:spPr>
+        <p:txBody>
+          <a:bodyPr anchor="ctr">
             <a:normAutofit/>
           </a:bodyPr>
           <a:lstStyle/>
           <a:p>
-            <a:r>
-              <a:rPr lang="vi-VN" sz="4800" b="1" cap="all" dirty="0">
-                <a:latin typeface="+mn-lt"/>
-                <a:ea typeface="Microsoft JhengHei" panose="020B0604030504040204" pitchFamily="34" charset="-120"/>
-              </a:rPr>
-              <a:t>I </a:t>
-            </a:r>
-            <a:r>
-              <a:rPr lang="vi-VN" sz="4800" b="1" cap="all" dirty="0" smtClean="0">
-                <a:latin typeface="+mn-lt"/>
-                <a:ea typeface="Microsoft JhengHei" panose="020B0604030504040204" pitchFamily="34" charset="-120"/>
-              </a:rPr>
-              <a:t>BELIEVE</a:t>
-            </a:r>
-            <a:r>
-              <a:rPr lang="vi-VN" sz="4800" b="1" cap="all" dirty="0" smtClean="0">
-                <a:ea typeface="Microsoft JhengHei" panose="020B0604030504040204" pitchFamily="34" charset="-120"/>
-              </a:rPr>
-              <a:t> </a:t>
-            </a:r>
-            <a:r>
-              <a:rPr lang="en-US" sz="4800" b="1" cap="all" dirty="0" smtClean="0">
+            <a:pPr marL="0" indent="0" algn="ctr">
+              <a:buNone/>
+            </a:pPr>
+            <a:r>
+              <a:rPr lang="zh-TW" altLang="en-US" sz="6400" b="1" dirty="0">
+                <a:solidFill>
+                  <a:srgbClr val="000066"/>
+                </a:solidFill>
                 <a:latin typeface="Microsoft JhengHei" panose="020B0604030504040204" pitchFamily="34" charset="-120"/>
                 <a:ea typeface="Microsoft JhengHei" panose="020B0604030504040204" pitchFamily="34" charset="-120"/>
               </a:rPr>
-              <a:t> </a:t>
-            </a:r>
-            <a:r>
-              <a:rPr lang="zh-CN" altLang="en-US" sz="4800" b="1" cap="all" dirty="0" smtClean="0">
+              <a:t>我相信聖靈住在我心</a:t>
+            </a:r>
+            <a:endParaRPr lang="en-US" altLang="zh-TW" sz="6400" b="1" dirty="0">
+              <a:solidFill>
+                <a:srgbClr val="000066"/>
+              </a:solidFill>
+              <a:latin typeface="Microsoft JhengHei" panose="020B0604030504040204" pitchFamily="34" charset="-120"/>
+              <a:ea typeface="Microsoft JhengHei" panose="020B0604030504040204" pitchFamily="34" charset="-120"/>
+            </a:endParaRPr>
+          </a:p>
+          <a:p>
+            <a:pPr marL="0" indent="0" algn="ctr">
+              <a:buNone/>
+            </a:pPr>
+            <a:r>
+              <a:rPr lang="zh-TW" altLang="en-US" sz="6400" b="1" dirty="0">
+                <a:solidFill>
+                  <a:srgbClr val="000066"/>
+                </a:solidFill>
                 <a:latin typeface="Microsoft JhengHei" panose="020B0604030504040204" pitchFamily="34" charset="-120"/>
                 <a:ea typeface="Microsoft JhengHei" panose="020B0604030504040204" pitchFamily="34" charset="-120"/>
               </a:rPr>
-              <a:t>我相信</a:t>
-            </a:r>
-            <a:endParaRPr lang="vi-VN" sz="4800" b="1" dirty="0">
-              <a:ea typeface="Microsoft JhengHei" panose="020B0604030504040204" pitchFamily="34" charset="-120"/>
-            </a:endParaRPr>
-          </a:p>
-        </p:txBody>
-      </p:sp>
-      <p:sp>
-        <p:nvSpPr>
-          <p:cNvPr id="3" name="Content Placeholder 2"/>
-          <p:cNvSpPr>
-            <a:spLocks noGrp="1"/>
-          </p:cNvSpPr>
-          <p:nvPr>
-            <p:ph idx="1"/>
-          </p:nvPr>
-        </p:nvSpPr>
-        <p:spPr/>
-        <p:txBody>
-          <a:bodyPr>
-            <a:normAutofit/>
-          </a:bodyPr>
-          <a:lstStyle/>
-          <a:p>
-            <a:pPr marL="0" indent="0" algn="ctr">
-              <a:buNone/>
-            </a:pPr>
-            <a:r>
-              <a:rPr lang="zh-TW" altLang="en-US" sz="5400" b="1" dirty="0">
-                <a:latin typeface="Microsoft JhengHei" panose="020B0604030504040204" pitchFamily="34" charset="-120"/>
-                <a:ea typeface="Microsoft JhengHei" panose="020B0604030504040204" pitchFamily="34" charset="-120"/>
-              </a:rPr>
-              <a:t>耶穌是</a:t>
-            </a:r>
-            <a:r>
-              <a:rPr lang="zh-TW" altLang="en-US" sz="5400" b="1" dirty="0">
-                <a:latin typeface="Microsoft JhengHei" panose="020B0604030504040204" pitchFamily="34" charset="-120"/>
-                <a:ea typeface="Microsoft JhengHei" panose="020B0604030504040204" pitchFamily="34" charset="-120"/>
-              </a:rPr>
-              <a:t>主</a:t>
-            </a:r>
-            <a:r>
-              <a:rPr lang="vi-VN" altLang="zh-TW" sz="5400" b="1" dirty="0">
-                <a:latin typeface="Microsoft JhengHei" panose="020B0604030504040204" pitchFamily="34" charset="-120"/>
-                <a:ea typeface="Microsoft JhengHei" panose="020B0604030504040204" pitchFamily="34" charset="-120"/>
-              </a:rPr>
-              <a:t>  </a:t>
-            </a:r>
-            <a:r>
-              <a:rPr lang="zh-TW" altLang="en-US" sz="5400" b="1" dirty="0">
-                <a:latin typeface="Microsoft JhengHei" panose="020B0604030504040204" pitchFamily="34" charset="-120"/>
-                <a:ea typeface="Microsoft JhengHei" panose="020B0604030504040204" pitchFamily="34" charset="-120"/>
-              </a:rPr>
-              <a:t>耶</a:t>
-            </a:r>
-            <a:r>
-              <a:rPr lang="zh-TW" altLang="en-US" sz="5400" b="1" dirty="0">
-                <a:latin typeface="Microsoft JhengHei" panose="020B0604030504040204" pitchFamily="34" charset="-120"/>
-                <a:ea typeface="Microsoft JhengHei" panose="020B0604030504040204" pitchFamily="34" charset="-120"/>
-              </a:rPr>
-              <a:t>穌是</a:t>
-            </a:r>
-            <a:r>
-              <a:rPr lang="zh-TW" altLang="en-US" sz="5400" b="1" dirty="0">
-                <a:latin typeface="Microsoft JhengHei" panose="020B0604030504040204" pitchFamily="34" charset="-120"/>
-                <a:ea typeface="Microsoft JhengHei" panose="020B0604030504040204" pitchFamily="34" charset="-120"/>
-              </a:rPr>
-              <a:t>主</a:t>
-            </a:r>
-            <a:endParaRPr lang="vi-VN" altLang="zh-TW" sz="5400" b="1" dirty="0">
-              <a:latin typeface="Microsoft JhengHei" panose="020B0604030504040204" pitchFamily="34" charset="-120"/>
-              <a:ea typeface="Microsoft JhengHei" panose="020B0604030504040204" pitchFamily="34" charset="-120"/>
-            </a:endParaRPr>
-          </a:p>
-          <a:p>
-            <a:pPr marL="0" indent="0" algn="ctr">
-              <a:buNone/>
-            </a:pPr>
-            <a:r>
-              <a:rPr lang="zh-TW" altLang="en-US" sz="5400" b="1" dirty="0">
-                <a:latin typeface="Microsoft JhengHei" panose="020B0604030504040204" pitchFamily="34" charset="-120"/>
-                <a:ea typeface="Microsoft JhengHei" panose="020B0604030504040204" pitchFamily="34" charset="-120"/>
-              </a:rPr>
-              <a:t>死</a:t>
-            </a:r>
-            <a:r>
-              <a:rPr lang="zh-TW" altLang="en-US" sz="5400" b="1" dirty="0">
-                <a:latin typeface="Microsoft JhengHei" panose="020B0604030504040204" pitchFamily="34" charset="-120"/>
-                <a:ea typeface="Microsoft JhengHei" panose="020B0604030504040204" pitchFamily="34" charset="-120"/>
-              </a:rPr>
-              <a:t>亡的毒</a:t>
-            </a:r>
-            <a:r>
-              <a:rPr lang="zh-TW" altLang="en-US" sz="5400" b="1" dirty="0">
-                <a:latin typeface="Microsoft JhengHei" panose="020B0604030504040204" pitchFamily="34" charset="-120"/>
-                <a:ea typeface="Microsoft JhengHei" panose="020B0604030504040204" pitchFamily="34" charset="-120"/>
-              </a:rPr>
-              <a:t>鈎</a:t>
-            </a:r>
-            <a:r>
-              <a:rPr lang="vi-VN" altLang="zh-TW" sz="5400" b="1" dirty="0">
-                <a:latin typeface="Microsoft JhengHei" panose="020B0604030504040204" pitchFamily="34" charset="-120"/>
-                <a:ea typeface="Microsoft JhengHei" panose="020B0604030504040204" pitchFamily="34" charset="-120"/>
-              </a:rPr>
-              <a:t>  </a:t>
-            </a:r>
-            <a:r>
-              <a:rPr lang="zh-TW" altLang="en-US" sz="5400" b="1" dirty="0">
-                <a:latin typeface="Microsoft JhengHei" panose="020B0604030504040204" pitchFamily="34" charset="-120"/>
-                <a:ea typeface="Microsoft JhengHei" panose="020B0604030504040204" pitchFamily="34" charset="-120"/>
-              </a:rPr>
-              <a:t>你</a:t>
-            </a:r>
-            <a:r>
-              <a:rPr lang="zh-TW" altLang="en-US" sz="5400" b="1" dirty="0">
-                <a:latin typeface="Microsoft JhengHei" panose="020B0604030504040204" pitchFamily="34" charset="-120"/>
-                <a:ea typeface="Microsoft JhengHei" panose="020B0604030504040204" pitchFamily="34" charset="-120"/>
-              </a:rPr>
-              <a:t>在哪</a:t>
-            </a:r>
-            <a:r>
-              <a:rPr lang="zh-TW" altLang="en-US" sz="5400" b="1" dirty="0">
-                <a:latin typeface="Microsoft JhengHei" panose="020B0604030504040204" pitchFamily="34" charset="-120"/>
-                <a:ea typeface="Microsoft JhengHei" panose="020B0604030504040204" pitchFamily="34" charset="-120"/>
-              </a:rPr>
-              <a:t>裡</a:t>
-            </a:r>
-            <a:endParaRPr lang="vi-VN" altLang="zh-TW" sz="5400" b="1" dirty="0">
-              <a:latin typeface="Microsoft JhengHei" panose="020B0604030504040204" pitchFamily="34" charset="-120"/>
-              <a:ea typeface="Microsoft JhengHei" panose="020B0604030504040204" pitchFamily="34" charset="-120"/>
-            </a:endParaRPr>
-          </a:p>
-          <a:p>
-            <a:pPr marL="0" indent="0" algn="ctr">
-              <a:buNone/>
-            </a:pPr>
-            <a:r>
-              <a:rPr lang="zh-TW" altLang="en-US" sz="5400" b="1" dirty="0">
-                <a:latin typeface="Microsoft JhengHei" panose="020B0604030504040204" pitchFamily="34" charset="-120"/>
-                <a:ea typeface="Microsoft JhengHei" panose="020B0604030504040204" pitchFamily="34" charset="-120"/>
-              </a:rPr>
-              <a:t>墳</a:t>
-            </a:r>
-            <a:r>
-              <a:rPr lang="zh-TW" altLang="en-US" sz="5400" b="1" dirty="0">
-                <a:latin typeface="Microsoft JhengHei" panose="020B0604030504040204" pitchFamily="34" charset="-120"/>
-                <a:ea typeface="Microsoft JhengHei" panose="020B0604030504040204" pitchFamily="34" charset="-120"/>
-              </a:rPr>
-              <a:t>墓不能勝過復活的能</a:t>
-            </a:r>
-            <a:r>
-              <a:rPr lang="zh-TW" altLang="en-US" sz="5400" b="1" dirty="0">
-                <a:latin typeface="Microsoft JhengHei" panose="020B0604030504040204" pitchFamily="34" charset="-120"/>
-                <a:ea typeface="Microsoft JhengHei" panose="020B0604030504040204" pitchFamily="34" charset="-120"/>
-              </a:rPr>
-              <a:t>力</a:t>
-            </a:r>
-            <a:endParaRPr lang="vi-VN" sz="5400" b="1" dirty="0">
-              <a:latin typeface="Microsoft JhengHei" panose="020B0604030504040204" pitchFamily="34" charset="-120"/>
+              <a:t>賜給我寶貴極大能力</a:t>
+            </a:r>
+            <a:endParaRPr lang="vi-VN" sz="6400" b="1" dirty="0">
+              <a:solidFill>
+                <a:srgbClr val="000066"/>
+              </a:solidFill>
               <a:ea typeface="Microsoft JhengHei" panose="020B0604030504040204" pitchFamily="34" charset="-120"/>
             </a:endParaRPr>
           </a:p>
@@ -3806,7 +3420,7 @@
     </p:spTree>
     <p:extLst>
       <p:ext uri="{BB962C8B-B14F-4D97-AF65-F5344CB8AC3E}">
-        <p14:creationId xmlns:p14="http://schemas.microsoft.com/office/powerpoint/2010/main" val="2831890323"/>
+        <p14:creationId xmlns:p14="http://schemas.microsoft.com/office/powerpoint/2010/main" val="1071745118"/>
       </p:ext>
     </p:extLst>
   </p:cSld>
@@ -3835,64 +3449,126 @@
       </p:grpSpPr>
       <p:sp>
         <p:nvSpPr>
-          <p:cNvPr id="2" name="Title 1"/>
-          <p:cNvSpPr>
-            <a:spLocks noGrp="1"/>
-          </p:cNvSpPr>
-          <p:nvPr>
-            <p:ph type="title"/>
-          </p:nvPr>
-        </p:nvSpPr>
-        <p:spPr/>
-        <p:txBody>
-          <a:bodyPr>
+          <p:cNvPr id="5" name="內容版面配置區 4"/>
+          <p:cNvSpPr>
+            <a:spLocks noGrp="1"/>
+          </p:cNvSpPr>
+          <p:nvPr>
+            <p:ph idx="1"/>
+          </p:nvPr>
+        </p:nvSpPr>
+        <p:spPr>
+          <a:xfrm>
+            <a:off x="0" y="2084851"/>
+            <a:ext cx="12192000" cy="2404863"/>
+          </a:xfrm>
+        </p:spPr>
+        <p:txBody>
+          <a:bodyPr anchor="ctr">
             <a:normAutofit/>
           </a:bodyPr>
           <a:lstStyle/>
           <a:p>
-            <a:r>
-              <a:rPr lang="vi-VN" sz="4800" b="1" cap="all" dirty="0">
-                <a:latin typeface="+mn-lt"/>
+            <a:pPr marL="0" indent="0" algn="ctr">
+              <a:buNone/>
+            </a:pPr>
+            <a:r>
+              <a:rPr lang="en-US" altLang="zh-TW" sz="6400" b="1" dirty="0">
+                <a:solidFill>
+                  <a:srgbClr val="000066"/>
+                </a:solidFill>
+                <a:latin typeface="Arial" panose="020B0604020202020204" pitchFamily="34" charset="0"/>
                 <a:ea typeface="Microsoft JhengHei" panose="020B0604030504040204" pitchFamily="34" charset="-120"/>
+                <a:cs typeface="Arial" panose="020B0604020202020204" pitchFamily="34" charset="0"/>
               </a:rPr>
-              <a:t>I </a:t>
-            </a:r>
-            <a:r>
-              <a:rPr lang="vi-VN" sz="4800" b="1" cap="all" dirty="0" smtClean="0">
-                <a:latin typeface="+mn-lt"/>
+              <a:t>I believe</a:t>
+            </a:r>
+            <a:r>
+              <a:rPr lang="vi-VN" altLang="zh-TW" sz="6400" b="1" dirty="0">
+                <a:solidFill>
+                  <a:srgbClr val="000066"/>
+                </a:solidFill>
+                <a:latin typeface="Arial" panose="020B0604020202020204" pitchFamily="34" charset="0"/>
                 <a:ea typeface="Microsoft JhengHei" panose="020B0604030504040204" pitchFamily="34" charset="-120"/>
+                <a:cs typeface="Arial" panose="020B0604020202020204" pitchFamily="34" charset="0"/>
               </a:rPr>
-              <a:t>BELIEVE</a:t>
-            </a:r>
-            <a:r>
-              <a:rPr lang="vi-VN" sz="4800" b="1" cap="all" dirty="0" smtClean="0">
-                <a:ea typeface="Microsoft JhengHei" panose="020B0604030504040204" pitchFamily="34" charset="-120"/>
-              </a:rPr>
-              <a:t> </a:t>
-            </a:r>
-            <a:r>
-              <a:rPr lang="en-US" sz="4800" b="1" cap="all" dirty="0" smtClean="0">
+              <a:t>  </a:t>
+            </a:r>
+            <a:r>
+              <a:rPr lang="zh-TW" altLang="en-US" sz="6400" b="1" dirty="0">
+                <a:solidFill>
+                  <a:srgbClr val="000066"/>
+                </a:solidFill>
                 <a:latin typeface="Microsoft JhengHei" panose="020B0604030504040204" pitchFamily="34" charset="-120"/>
                 <a:ea typeface="Microsoft JhengHei" panose="020B0604030504040204" pitchFamily="34" charset="-120"/>
               </a:rPr>
-              <a:t> </a:t>
-            </a:r>
-            <a:r>
-              <a:rPr lang="zh-CN" altLang="en-US" sz="4800" b="1" cap="all" dirty="0" smtClean="0">
+              <a:t>我相信耶穌是真神</a:t>
+            </a:r>
+            <a:endParaRPr lang="vi-VN" altLang="zh-TW" sz="6400" b="1" dirty="0">
+              <a:solidFill>
+                <a:srgbClr val="000066"/>
+              </a:solidFill>
+              <a:latin typeface="Microsoft JhengHei" panose="020B0604030504040204" pitchFamily="34" charset="-120"/>
+              <a:ea typeface="Microsoft JhengHei" panose="020B0604030504040204" pitchFamily="34" charset="-120"/>
+            </a:endParaRPr>
+          </a:p>
+          <a:p>
+            <a:pPr marL="0" indent="0" algn="ctr">
+              <a:buNone/>
+            </a:pPr>
+            <a:r>
+              <a:rPr lang="zh-TW" altLang="en-US" sz="6400" b="1" dirty="0">
+                <a:solidFill>
+                  <a:srgbClr val="000066"/>
+                </a:solidFill>
                 <a:latin typeface="Microsoft JhengHei" panose="020B0604030504040204" pitchFamily="34" charset="-120"/>
                 <a:ea typeface="Microsoft JhengHei" panose="020B0604030504040204" pitchFamily="34" charset="-120"/>
               </a:rPr>
-              <a:t>我相信</a:t>
-            </a:r>
-            <a:endParaRPr lang="vi-VN" sz="4800" b="1" dirty="0">
+              <a:t>永遠得勝君王</a:t>
+            </a:r>
+            <a:endParaRPr lang="vi-VN" altLang="zh-TW" sz="6400" b="1" dirty="0">
+              <a:solidFill>
+                <a:srgbClr val="000066"/>
+              </a:solidFill>
+              <a:latin typeface="Microsoft JhengHei" panose="020B0604030504040204" pitchFamily="34" charset="-120"/>
               <a:ea typeface="Microsoft JhengHei" panose="020B0604030504040204" pitchFamily="34" charset="-120"/>
             </a:endParaRPr>
           </a:p>
         </p:txBody>
       </p:sp>
-      <p:sp>
-        <p:nvSpPr>
-          <p:cNvPr id="3" name="Content Placeholder 2"/>
+    </p:spTree>
+    <p:extLst>
+      <p:ext uri="{BB962C8B-B14F-4D97-AF65-F5344CB8AC3E}">
+        <p14:creationId xmlns:p14="http://schemas.microsoft.com/office/powerpoint/2010/main" val="4177572464"/>
+      </p:ext>
+    </p:extLst>
+  </p:cSld>
+  <p:clrMapOvr>
+    <a:masterClrMapping/>
+  </p:clrMapOvr>
+</p:sld>
+</file>
+
+<file path=ppt/slides/slide5.xml><?xml version="1.0" encoding="utf-8"?>
+<p:sld xmlns:a="http://schemas.openxmlformats.org/drawingml/2006/main" xmlns:r="http://schemas.openxmlformats.org/officeDocument/2006/relationships" xmlns:p="http://schemas.openxmlformats.org/presentationml/2006/main">
+  <p:cSld>
+    <p:spTree>
+      <p:nvGrpSpPr>
+        <p:cNvPr id="1" name=""/>
+        <p:cNvGrpSpPr/>
+        <p:nvPr/>
+      </p:nvGrpSpPr>
+      <p:grpSpPr>
+        <a:xfrm>
+          <a:off x="0" y="0"/>
+          <a:ext cx="0" cy="0"/>
+          <a:chOff x="0" y="0"/>
+          <a:chExt cx="0" cy="0"/>
+        </a:xfrm>
+      </p:grpSpPr>
+      <p:sp>
+        <p:nvSpPr>
+          <p:cNvPr id="5" name="內容版面配置區 4"/>
           <p:cNvSpPr>
             <a:spLocks noGrp="1"/>
           </p:cNvSpPr>
@@ -3900,9 +3576,14 @@
             <p:ph idx="1"/>
           </p:nvPr>
         </p:nvSpPr>
-        <p:spPr/>
-        <p:txBody>
-          <a:bodyPr>
+        <p:spPr>
+          <a:xfrm>
+            <a:off x="0" y="2084851"/>
+            <a:ext cx="12192000" cy="2404863"/>
+          </a:xfrm>
+        </p:spPr>
+        <p:txBody>
+          <a:bodyPr anchor="ctr">
             <a:normAutofit/>
           </a:bodyPr>
           <a:lstStyle/>
@@ -3911,157 +3592,208 @@
               <a:buNone/>
             </a:pPr>
             <a:r>
-              <a:rPr lang="zh-TW" altLang="en-US" sz="5400" b="1" dirty="0">
+              <a:rPr lang="zh-TW" altLang="en-US" sz="6400" b="1" dirty="0">
+                <a:solidFill>
+                  <a:srgbClr val="000066"/>
+                </a:solidFill>
                 <a:latin typeface="Microsoft JhengHei" panose="020B0604030504040204" pitchFamily="34" charset="-120"/>
                 <a:ea typeface="Microsoft JhengHei" panose="020B0604030504040204" pitchFamily="34" charset="-120"/>
               </a:rPr>
-              <a:t>耶穌是</a:t>
-            </a:r>
-            <a:r>
-              <a:rPr lang="zh-TW" altLang="en-US" sz="5400" b="1" dirty="0">
-                <a:latin typeface="Microsoft JhengHei" panose="020B0604030504040204" pitchFamily="34" charset="-120"/>
-                <a:ea typeface="Microsoft JhengHei" panose="020B0604030504040204" pitchFamily="34" charset="-120"/>
-              </a:rPr>
-              <a:t>主</a:t>
-            </a:r>
-            <a:r>
-              <a:rPr lang="vi-VN" altLang="zh-TW" sz="5400" b="1" dirty="0">
+              <a:t>我敬拜</a:t>
+            </a:r>
+            <a:r>
+              <a:rPr lang="vi-VN" altLang="zh-TW" sz="6400" b="1" dirty="0">
+                <a:solidFill>
+                  <a:srgbClr val="000066"/>
+                </a:solidFill>
                 <a:latin typeface="Microsoft JhengHei" panose="020B0604030504040204" pitchFamily="34" charset="-120"/>
                 <a:ea typeface="Microsoft JhengHei" panose="020B0604030504040204" pitchFamily="34" charset="-120"/>
               </a:rPr>
               <a:t>  </a:t>
             </a:r>
             <a:r>
-              <a:rPr lang="zh-TW" altLang="en-US" sz="5400" b="1" dirty="0">
+              <a:rPr lang="zh-TW" altLang="en-US" sz="6400" b="1" dirty="0">
+                <a:solidFill>
+                  <a:srgbClr val="000066"/>
+                </a:solidFill>
                 <a:latin typeface="Microsoft JhengHei" panose="020B0604030504040204" pitchFamily="34" charset="-120"/>
                 <a:ea typeface="Microsoft JhengHei" panose="020B0604030504040204" pitchFamily="34" charset="-120"/>
               </a:rPr>
-              <a:t>耶</a:t>
-            </a:r>
-            <a:r>
-              <a:rPr lang="zh-TW" altLang="en-US" sz="5400" b="1" dirty="0">
+              <a:t>高舉耶穌基督的名</a:t>
+            </a:r>
+            <a:endParaRPr lang="vi-VN" altLang="zh-TW" sz="6400" b="1" dirty="0">
+              <a:solidFill>
+                <a:srgbClr val="000066"/>
+              </a:solidFill>
+              <a:latin typeface="Microsoft JhengHei" panose="020B0604030504040204" pitchFamily="34" charset="-120"/>
+              <a:ea typeface="Microsoft JhengHei" panose="020B0604030504040204" pitchFamily="34" charset="-120"/>
+            </a:endParaRPr>
+          </a:p>
+          <a:p>
+            <a:pPr marL="0" indent="0" algn="ctr">
+              <a:buNone/>
+            </a:pPr>
+            <a:r>
+              <a:rPr lang="zh-TW" altLang="en-US" sz="6400" b="1" dirty="0">
+                <a:solidFill>
+                  <a:srgbClr val="000066"/>
+                </a:solidFill>
                 <a:latin typeface="Microsoft JhengHei" panose="020B0604030504040204" pitchFamily="34" charset="-120"/>
                 <a:ea typeface="Microsoft JhengHei" panose="020B0604030504040204" pitchFamily="34" charset="-120"/>
               </a:rPr>
-              <a:t>穌是</a:t>
-            </a:r>
-            <a:r>
-              <a:rPr lang="zh-TW" altLang="en-US" sz="5400" b="1" dirty="0">
+              <a:t>超乎萬名之上的名</a:t>
+            </a:r>
+            <a:endParaRPr lang="vi-VN" sz="6400" b="1" dirty="0">
+              <a:solidFill>
+                <a:srgbClr val="000066"/>
+              </a:solidFill>
+              <a:latin typeface="Microsoft JhengHei" panose="020B0604030504040204" pitchFamily="34" charset="-120"/>
+              <a:ea typeface="Microsoft JhengHei" panose="020B0604030504040204" pitchFamily="34" charset="-120"/>
+            </a:endParaRPr>
+          </a:p>
+        </p:txBody>
+      </p:sp>
+    </p:spTree>
+    <p:extLst>
+      <p:ext uri="{BB962C8B-B14F-4D97-AF65-F5344CB8AC3E}">
+        <p14:creationId xmlns:p14="http://schemas.microsoft.com/office/powerpoint/2010/main" val="3125413652"/>
+      </p:ext>
+    </p:extLst>
+  </p:cSld>
+  <p:clrMapOvr>
+    <a:masterClrMapping/>
+  </p:clrMapOvr>
+</p:sld>
+</file>
+
+<file path=ppt/slides/slide6.xml><?xml version="1.0" encoding="utf-8"?>
+<p:sld xmlns:a="http://schemas.openxmlformats.org/drawingml/2006/main" xmlns:r="http://schemas.openxmlformats.org/officeDocument/2006/relationships" xmlns:p="http://schemas.openxmlformats.org/presentationml/2006/main">
+  <p:cSld>
+    <p:spTree>
+      <p:nvGrpSpPr>
+        <p:cNvPr id="1" name=""/>
+        <p:cNvGrpSpPr/>
+        <p:nvPr/>
+      </p:nvGrpSpPr>
+      <p:grpSpPr>
+        <a:xfrm>
+          <a:off x="0" y="0"/>
+          <a:ext cx="0" cy="0"/>
+          <a:chOff x="0" y="0"/>
+          <a:chExt cx="0" cy="0"/>
+        </a:xfrm>
+      </p:grpSpPr>
+      <p:sp>
+        <p:nvSpPr>
+          <p:cNvPr id="5" name="內容版面配置區 4"/>
+          <p:cNvSpPr>
+            <a:spLocks noGrp="1"/>
+          </p:cNvSpPr>
+          <p:nvPr>
+            <p:ph idx="1"/>
+          </p:nvPr>
+        </p:nvSpPr>
+        <p:spPr>
+          <a:xfrm>
+            <a:off x="0" y="2084851"/>
+            <a:ext cx="12192000" cy="2404863"/>
+          </a:xfrm>
+        </p:spPr>
+        <p:txBody>
+          <a:bodyPr anchor="ctr">
+            <a:normAutofit/>
+          </a:bodyPr>
+          <a:lstStyle/>
+          <a:p>
+            <a:pPr marL="0" indent="0" algn="ctr">
+              <a:buNone/>
+            </a:pPr>
+            <a:r>
+              <a:rPr lang="zh-TW" altLang="en-US" sz="6400" b="1" dirty="0">
+                <a:solidFill>
+                  <a:srgbClr val="000066"/>
+                </a:solidFill>
                 <a:latin typeface="Microsoft JhengHei" panose="020B0604030504040204" pitchFamily="34" charset="-120"/>
                 <a:ea typeface="Microsoft JhengHei" panose="020B0604030504040204" pitchFamily="34" charset="-120"/>
               </a:rPr>
-              <a:t>主</a:t>
-            </a:r>
-            <a:endParaRPr lang="vi-VN" altLang="zh-TW" sz="5400" b="1" dirty="0">
-              <a:latin typeface="Microsoft JhengHei" panose="020B0604030504040204" pitchFamily="34" charset="-120"/>
-              <a:ea typeface="Microsoft JhengHei" panose="020B0604030504040204" pitchFamily="34" charset="-120"/>
-            </a:endParaRPr>
-          </a:p>
-          <a:p>
-            <a:pPr marL="0" indent="0" algn="ctr">
-              <a:buNone/>
-            </a:pPr>
-            <a:r>
-              <a:rPr lang="zh-TW" altLang="en-US" sz="5400" b="1" dirty="0">
-                <a:latin typeface="Microsoft JhengHei" panose="020B0604030504040204" pitchFamily="34" charset="-120"/>
-                <a:ea typeface="Microsoft JhengHei" panose="020B0604030504040204" pitchFamily="34" charset="-120"/>
-              </a:rPr>
-              <a:t>萬</a:t>
-            </a:r>
-            <a:r>
-              <a:rPr lang="zh-TW" altLang="en-US" sz="5400" b="1" dirty="0">
-                <a:latin typeface="Microsoft JhengHei" panose="020B0604030504040204" pitchFamily="34" charset="-120"/>
-                <a:ea typeface="Microsoft JhengHei" panose="020B0604030504040204" pitchFamily="34" charset="-120"/>
-              </a:rPr>
-              <a:t>膝要跪</a:t>
-            </a:r>
-            <a:r>
-              <a:rPr lang="zh-TW" altLang="en-US" sz="5400" b="1" dirty="0">
-                <a:latin typeface="Microsoft JhengHei" panose="020B0604030504040204" pitchFamily="34" charset="-120"/>
-                <a:ea typeface="Microsoft JhengHei" panose="020B0604030504040204" pitchFamily="34" charset="-120"/>
-              </a:rPr>
-              <a:t>拜</a:t>
-            </a:r>
-            <a:r>
-              <a:rPr lang="vi-VN" altLang="zh-TW" sz="5400" b="1" dirty="0">
+              <a:t>耶穌是主</a:t>
+            </a:r>
+            <a:r>
+              <a:rPr lang="vi-VN" altLang="zh-TW" sz="6400" b="1" dirty="0">
+                <a:solidFill>
+                  <a:srgbClr val="000066"/>
+                </a:solidFill>
                 <a:latin typeface="Microsoft JhengHei" panose="020B0604030504040204" pitchFamily="34" charset="-120"/>
                 <a:ea typeface="Microsoft JhengHei" panose="020B0604030504040204" pitchFamily="34" charset="-120"/>
               </a:rPr>
               <a:t>  </a:t>
             </a:r>
             <a:r>
-              <a:rPr lang="zh-TW" altLang="en-US" sz="5400" b="1" dirty="0">
+              <a:rPr lang="zh-TW" altLang="en-US" sz="6400" b="1" dirty="0">
+                <a:solidFill>
+                  <a:srgbClr val="000066"/>
+                </a:solidFill>
                 <a:latin typeface="Microsoft JhengHei" panose="020B0604030504040204" pitchFamily="34" charset="-120"/>
                 <a:ea typeface="Microsoft JhengHei" panose="020B0604030504040204" pitchFamily="34" charset="-120"/>
               </a:rPr>
-              <a:t>萬</a:t>
-            </a:r>
-            <a:r>
-              <a:rPr lang="zh-TW" altLang="en-US" sz="5400" b="1" dirty="0">
+              <a:t>耶穌是主</a:t>
+            </a:r>
+            <a:endParaRPr lang="vi-VN" altLang="zh-TW" sz="6400" b="1" dirty="0">
+              <a:solidFill>
+                <a:srgbClr val="000066"/>
+              </a:solidFill>
+              <a:latin typeface="Microsoft JhengHei" panose="020B0604030504040204" pitchFamily="34" charset="-120"/>
+              <a:ea typeface="Microsoft JhengHei" panose="020B0604030504040204" pitchFamily="34" charset="-120"/>
+            </a:endParaRPr>
+          </a:p>
+          <a:p>
+            <a:pPr marL="0" indent="0" algn="ctr">
+              <a:buNone/>
+            </a:pPr>
+            <a:r>
+              <a:rPr lang="zh-TW" altLang="en-US" sz="6400" b="1" dirty="0">
+                <a:solidFill>
+                  <a:srgbClr val="000066"/>
+                </a:solidFill>
                 <a:latin typeface="Microsoft JhengHei" panose="020B0604030504040204" pitchFamily="34" charset="-120"/>
                 <a:ea typeface="Microsoft JhengHei" panose="020B0604030504040204" pitchFamily="34" charset="-120"/>
               </a:rPr>
-              <a:t>口承</a:t>
-            </a:r>
-            <a:r>
-              <a:rPr lang="zh-TW" altLang="en-US" sz="5400" b="1" dirty="0">
-                <a:latin typeface="Microsoft JhengHei" panose="020B0604030504040204" pitchFamily="34" charset="-120"/>
-                <a:ea typeface="Microsoft JhengHei" panose="020B0604030504040204" pitchFamily="34" charset="-120"/>
-              </a:rPr>
-              <a:t>認</a:t>
-            </a:r>
-            <a:endParaRPr lang="vi-VN" altLang="zh-TW" sz="5400" b="1" dirty="0">
-              <a:latin typeface="Microsoft JhengHei" panose="020B0604030504040204" pitchFamily="34" charset="-120"/>
-              <a:ea typeface="Microsoft JhengHei" panose="020B0604030504040204" pitchFamily="34" charset="-120"/>
-            </a:endParaRPr>
-          </a:p>
-          <a:p>
-            <a:pPr marL="0" indent="0" algn="ctr">
-              <a:buNone/>
-            </a:pPr>
-            <a:r>
-              <a:rPr lang="zh-TW" altLang="en-US" sz="5400" b="1" dirty="0">
-                <a:latin typeface="Microsoft JhengHei" panose="020B0604030504040204" pitchFamily="34" charset="-120"/>
-                <a:ea typeface="Microsoft JhengHei" panose="020B0604030504040204" pitchFamily="34" charset="-120"/>
-              </a:rPr>
-              <a:t>耶</a:t>
-            </a:r>
-            <a:r>
-              <a:rPr lang="zh-TW" altLang="en-US" sz="5400" b="1" dirty="0">
-                <a:latin typeface="Microsoft JhengHei" panose="020B0604030504040204" pitchFamily="34" charset="-120"/>
-                <a:ea typeface="Microsoft JhengHei" panose="020B0604030504040204" pitchFamily="34" charset="-120"/>
-              </a:rPr>
-              <a:t>穌基</a:t>
-            </a:r>
-            <a:r>
-              <a:rPr lang="zh-TW" altLang="en-US" sz="5400" b="1" dirty="0">
-                <a:latin typeface="Microsoft JhengHei" panose="020B0604030504040204" pitchFamily="34" charset="-120"/>
-                <a:ea typeface="Microsoft JhengHei" panose="020B0604030504040204" pitchFamily="34" charset="-120"/>
-              </a:rPr>
-              <a:t>督</a:t>
-            </a:r>
-            <a:r>
-              <a:rPr lang="vi-VN" altLang="zh-TW" sz="5400" b="1" dirty="0">
+              <a:t>死亡的毒鈎</a:t>
+            </a:r>
+            <a:r>
+              <a:rPr lang="vi-VN" altLang="zh-TW" sz="6400" b="1" dirty="0">
+                <a:solidFill>
+                  <a:srgbClr val="000066"/>
+                </a:solidFill>
                 <a:latin typeface="Microsoft JhengHei" panose="020B0604030504040204" pitchFamily="34" charset="-120"/>
                 <a:ea typeface="Microsoft JhengHei" panose="020B0604030504040204" pitchFamily="34" charset="-120"/>
               </a:rPr>
               <a:t>  </a:t>
             </a:r>
             <a:r>
-              <a:rPr lang="zh-TW" altLang="en-US" sz="5400" b="1" dirty="0">
+              <a:rPr lang="zh-CN" altLang="en-US" sz="6400" b="1" dirty="0">
+                <a:solidFill>
+                  <a:srgbClr val="000066"/>
+                </a:solidFill>
                 <a:latin typeface="Microsoft JhengHei" panose="020B0604030504040204" pitchFamily="34" charset="-120"/>
                 <a:ea typeface="Microsoft JhengHei" panose="020B0604030504040204" pitchFamily="34" charset="-120"/>
               </a:rPr>
-              <a:t>世</a:t>
-            </a:r>
-            <a:r>
-              <a:rPr lang="zh-TW" altLang="en-US" sz="5400" b="1" dirty="0">
+              <a:t>袮</a:t>
+            </a:r>
+            <a:r>
+              <a:rPr lang="zh-TW" altLang="en-US" sz="6400" b="1" dirty="0">
+                <a:solidFill>
+                  <a:srgbClr val="000066"/>
+                </a:solidFill>
                 <a:latin typeface="Microsoft JhengHei" panose="020B0604030504040204" pitchFamily="34" charset="-120"/>
                 <a:ea typeface="Microsoft JhengHei" panose="020B0604030504040204" pitchFamily="34" charset="-120"/>
               </a:rPr>
-              <a:t>界的主</a:t>
-            </a:r>
-            <a:endParaRPr lang="vi-VN" sz="5400" b="1" dirty="0">
+              <a:t>在哪裡</a:t>
+            </a:r>
+            <a:endParaRPr lang="vi-VN" altLang="zh-TW" sz="6400" b="1" dirty="0">
+              <a:solidFill>
+                <a:srgbClr val="000066"/>
+              </a:solidFill>
               <a:latin typeface="Microsoft JhengHei" panose="020B0604030504040204" pitchFamily="34" charset="-120"/>
               <a:ea typeface="Microsoft JhengHei" panose="020B0604030504040204" pitchFamily="34" charset="-120"/>
             </a:endParaRPr>
@@ -4071,7 +3803,314 @@
     </p:spTree>
     <p:extLst>
       <p:ext uri="{BB962C8B-B14F-4D97-AF65-F5344CB8AC3E}">
-        <p14:creationId xmlns:p14="http://schemas.microsoft.com/office/powerpoint/2010/main" val="1241504094"/>
+        <p14:creationId xmlns:p14="http://schemas.microsoft.com/office/powerpoint/2010/main" val="389726156"/>
+      </p:ext>
+    </p:extLst>
+  </p:cSld>
+  <p:clrMapOvr>
+    <a:masterClrMapping/>
+  </p:clrMapOvr>
+</p:sld>
+</file>
+
+<file path=ppt/slides/slide7.xml><?xml version="1.0" encoding="utf-8"?>
+<p:sld xmlns:a="http://schemas.openxmlformats.org/drawingml/2006/main" xmlns:r="http://schemas.openxmlformats.org/officeDocument/2006/relationships" xmlns:p="http://schemas.openxmlformats.org/presentationml/2006/main">
+  <p:cSld>
+    <p:spTree>
+      <p:nvGrpSpPr>
+        <p:cNvPr id="1" name=""/>
+        <p:cNvGrpSpPr/>
+        <p:nvPr/>
+      </p:nvGrpSpPr>
+      <p:grpSpPr>
+        <a:xfrm>
+          <a:off x="0" y="0"/>
+          <a:ext cx="0" cy="0"/>
+          <a:chOff x="0" y="0"/>
+          <a:chExt cx="0" cy="0"/>
+        </a:xfrm>
+      </p:grpSpPr>
+      <p:sp>
+        <p:nvSpPr>
+          <p:cNvPr id="5" name="內容版面配置區 4"/>
+          <p:cNvSpPr>
+            <a:spLocks noGrp="1"/>
+          </p:cNvSpPr>
+          <p:nvPr>
+            <p:ph idx="1"/>
+          </p:nvPr>
+        </p:nvSpPr>
+        <p:spPr>
+          <a:xfrm>
+            <a:off x="0" y="2084851"/>
+            <a:ext cx="12192000" cy="2404863"/>
+          </a:xfrm>
+        </p:spPr>
+        <p:txBody>
+          <a:bodyPr anchor="ctr">
+            <a:normAutofit/>
+          </a:bodyPr>
+          <a:lstStyle/>
+          <a:p>
+            <a:pPr marL="0" indent="0" algn="ctr">
+              <a:buNone/>
+            </a:pPr>
+            <a:r>
+              <a:rPr lang="zh-TW" altLang="en-US" sz="6400" b="1" dirty="0">
+                <a:solidFill>
+                  <a:srgbClr val="000066"/>
+                </a:solidFill>
+                <a:latin typeface="Microsoft JhengHei" panose="020B0604030504040204" pitchFamily="34" charset="-120"/>
+                <a:ea typeface="Microsoft JhengHei" panose="020B0604030504040204" pitchFamily="34" charset="-120"/>
+              </a:rPr>
+              <a:t>墳墓不能勝過復活的能力</a:t>
+            </a:r>
+            <a:endParaRPr lang="vi-VN" sz="6400" b="1" dirty="0">
+              <a:solidFill>
+                <a:srgbClr val="000066"/>
+              </a:solidFill>
+              <a:latin typeface="Microsoft JhengHei" panose="020B0604030504040204" pitchFamily="34" charset="-120"/>
+              <a:ea typeface="Microsoft JhengHei" panose="020B0604030504040204" pitchFamily="34" charset="-120"/>
+            </a:endParaRPr>
+          </a:p>
+        </p:txBody>
+      </p:sp>
+    </p:spTree>
+    <p:extLst>
+      <p:ext uri="{BB962C8B-B14F-4D97-AF65-F5344CB8AC3E}">
+        <p14:creationId xmlns:p14="http://schemas.microsoft.com/office/powerpoint/2010/main" val="495734410"/>
+      </p:ext>
+    </p:extLst>
+  </p:cSld>
+  <p:clrMapOvr>
+    <a:masterClrMapping/>
+  </p:clrMapOvr>
+</p:sld>
+</file>
+
+<file path=ppt/slides/slide8.xml><?xml version="1.0" encoding="utf-8"?>
+<p:sld xmlns:a="http://schemas.openxmlformats.org/drawingml/2006/main" xmlns:r="http://schemas.openxmlformats.org/officeDocument/2006/relationships" xmlns:p="http://schemas.openxmlformats.org/presentationml/2006/main">
+  <p:cSld>
+    <p:spTree>
+      <p:nvGrpSpPr>
+        <p:cNvPr id="1" name=""/>
+        <p:cNvGrpSpPr/>
+        <p:nvPr/>
+      </p:nvGrpSpPr>
+      <p:grpSpPr>
+        <a:xfrm>
+          <a:off x="0" y="0"/>
+          <a:ext cx="0" cy="0"/>
+          <a:chOff x="0" y="0"/>
+          <a:chExt cx="0" cy="0"/>
+        </a:xfrm>
+      </p:grpSpPr>
+      <p:sp>
+        <p:nvSpPr>
+          <p:cNvPr id="5" name="內容版面配置區 4"/>
+          <p:cNvSpPr>
+            <a:spLocks noGrp="1"/>
+          </p:cNvSpPr>
+          <p:nvPr>
+            <p:ph idx="1"/>
+          </p:nvPr>
+        </p:nvSpPr>
+        <p:spPr>
+          <a:xfrm>
+            <a:off x="0" y="2084851"/>
+            <a:ext cx="12192000" cy="2404863"/>
+          </a:xfrm>
+        </p:spPr>
+        <p:txBody>
+          <a:bodyPr anchor="ctr">
+            <a:normAutofit/>
+          </a:bodyPr>
+          <a:lstStyle/>
+          <a:p>
+            <a:pPr marL="0" indent="0" algn="ctr">
+              <a:buNone/>
+            </a:pPr>
+            <a:r>
+              <a:rPr lang="zh-TW" altLang="en-US" sz="6400" b="1" dirty="0">
+                <a:solidFill>
+                  <a:srgbClr val="000066"/>
+                </a:solidFill>
+                <a:latin typeface="Microsoft JhengHei" panose="020B0604030504040204" pitchFamily="34" charset="-120"/>
+                <a:ea typeface="Microsoft JhengHei" panose="020B0604030504040204" pitchFamily="34" charset="-120"/>
+              </a:rPr>
+              <a:t>耶穌是主</a:t>
+            </a:r>
+            <a:r>
+              <a:rPr lang="vi-VN" altLang="zh-TW" sz="6400" b="1" dirty="0">
+                <a:solidFill>
+                  <a:srgbClr val="000066"/>
+                </a:solidFill>
+                <a:latin typeface="Microsoft JhengHei" panose="020B0604030504040204" pitchFamily="34" charset="-120"/>
+                <a:ea typeface="Microsoft JhengHei" panose="020B0604030504040204" pitchFamily="34" charset="-120"/>
+              </a:rPr>
+              <a:t>  </a:t>
+            </a:r>
+            <a:r>
+              <a:rPr lang="zh-TW" altLang="en-US" sz="6400" b="1" dirty="0">
+                <a:solidFill>
+                  <a:srgbClr val="000066"/>
+                </a:solidFill>
+                <a:latin typeface="Microsoft JhengHei" panose="020B0604030504040204" pitchFamily="34" charset="-120"/>
+                <a:ea typeface="Microsoft JhengHei" panose="020B0604030504040204" pitchFamily="34" charset="-120"/>
+              </a:rPr>
+              <a:t>耶穌是主</a:t>
+            </a:r>
+            <a:endParaRPr lang="vi-VN" altLang="zh-TW" sz="6400" b="1" dirty="0">
+              <a:solidFill>
+                <a:srgbClr val="000066"/>
+              </a:solidFill>
+              <a:latin typeface="Microsoft JhengHei" panose="020B0604030504040204" pitchFamily="34" charset="-120"/>
+              <a:ea typeface="Microsoft JhengHei" panose="020B0604030504040204" pitchFamily="34" charset="-120"/>
+            </a:endParaRPr>
+          </a:p>
+          <a:p>
+            <a:pPr marL="0" indent="0" algn="ctr">
+              <a:buNone/>
+            </a:pPr>
+            <a:r>
+              <a:rPr lang="zh-TW" altLang="en-US" sz="6400" b="1" dirty="0">
+                <a:solidFill>
+                  <a:srgbClr val="000066"/>
+                </a:solidFill>
+                <a:latin typeface="Microsoft JhengHei" panose="020B0604030504040204" pitchFamily="34" charset="-120"/>
+                <a:ea typeface="Microsoft JhengHei" panose="020B0604030504040204" pitchFamily="34" charset="-120"/>
+              </a:rPr>
+              <a:t>萬膝要跪拜</a:t>
+            </a:r>
+            <a:r>
+              <a:rPr lang="vi-VN" altLang="zh-TW" sz="6400" b="1" dirty="0">
+                <a:solidFill>
+                  <a:srgbClr val="000066"/>
+                </a:solidFill>
+                <a:latin typeface="Microsoft JhengHei" panose="020B0604030504040204" pitchFamily="34" charset="-120"/>
+                <a:ea typeface="Microsoft JhengHei" panose="020B0604030504040204" pitchFamily="34" charset="-120"/>
+              </a:rPr>
+              <a:t>  </a:t>
+            </a:r>
+            <a:r>
+              <a:rPr lang="zh-TW" altLang="en-US" sz="6400" b="1" dirty="0">
+                <a:solidFill>
+                  <a:srgbClr val="000066"/>
+                </a:solidFill>
+                <a:latin typeface="Microsoft JhengHei" panose="020B0604030504040204" pitchFamily="34" charset="-120"/>
+                <a:ea typeface="Microsoft JhengHei" panose="020B0604030504040204" pitchFamily="34" charset="-120"/>
+              </a:rPr>
+              <a:t>萬口承認</a:t>
+            </a:r>
+            <a:endParaRPr lang="vi-VN" altLang="zh-TW" sz="6400" b="1" dirty="0">
+              <a:solidFill>
+                <a:srgbClr val="000066"/>
+              </a:solidFill>
+              <a:latin typeface="Microsoft JhengHei" panose="020B0604030504040204" pitchFamily="34" charset="-120"/>
+              <a:ea typeface="Microsoft JhengHei" panose="020B0604030504040204" pitchFamily="34" charset="-120"/>
+            </a:endParaRPr>
+          </a:p>
+        </p:txBody>
+      </p:sp>
+    </p:spTree>
+    <p:extLst>
+      <p:ext uri="{BB962C8B-B14F-4D97-AF65-F5344CB8AC3E}">
+        <p14:creationId xmlns:p14="http://schemas.microsoft.com/office/powerpoint/2010/main" val="3682767630"/>
+      </p:ext>
+    </p:extLst>
+  </p:cSld>
+  <p:clrMapOvr>
+    <a:masterClrMapping/>
+  </p:clrMapOvr>
+</p:sld>
+</file>
+
+<file path=ppt/slides/slide9.xml><?xml version="1.0" encoding="utf-8"?>
+<p:sld xmlns:a="http://schemas.openxmlformats.org/drawingml/2006/main" xmlns:r="http://schemas.openxmlformats.org/officeDocument/2006/relationships" xmlns:p="http://schemas.openxmlformats.org/presentationml/2006/main">
+  <p:cSld>
+    <p:spTree>
+      <p:nvGrpSpPr>
+        <p:cNvPr id="1" name=""/>
+        <p:cNvGrpSpPr/>
+        <p:nvPr/>
+      </p:nvGrpSpPr>
+      <p:grpSpPr>
+        <a:xfrm>
+          <a:off x="0" y="0"/>
+          <a:ext cx="0" cy="0"/>
+          <a:chOff x="0" y="0"/>
+          <a:chExt cx="0" cy="0"/>
+        </a:xfrm>
+      </p:grpSpPr>
+      <p:sp>
+        <p:nvSpPr>
+          <p:cNvPr id="5" name="內容版面配置區 4"/>
+          <p:cNvSpPr>
+            <a:spLocks noGrp="1"/>
+          </p:cNvSpPr>
+          <p:nvPr>
+            <p:ph idx="1"/>
+          </p:nvPr>
+        </p:nvSpPr>
+        <p:spPr>
+          <a:xfrm>
+            <a:off x="0" y="2084851"/>
+            <a:ext cx="12192000" cy="2404863"/>
+          </a:xfrm>
+        </p:spPr>
+        <p:txBody>
+          <a:bodyPr anchor="ctr">
+            <a:normAutofit/>
+          </a:bodyPr>
+          <a:lstStyle/>
+          <a:p>
+            <a:pPr marL="0" indent="0" algn="ctr">
+              <a:buNone/>
+            </a:pPr>
+            <a:r>
+              <a:rPr lang="zh-TW" altLang="en-US" sz="6400" b="1" dirty="0">
+                <a:solidFill>
+                  <a:srgbClr val="000066"/>
+                </a:solidFill>
+                <a:latin typeface="Microsoft JhengHei" panose="020B0604030504040204" pitchFamily="34" charset="-120"/>
+                <a:ea typeface="Microsoft JhengHei" panose="020B0604030504040204" pitchFamily="34" charset="-120"/>
+              </a:rPr>
+              <a:t>耶穌基督</a:t>
+            </a:r>
+            <a:r>
+              <a:rPr lang="vi-VN" altLang="zh-TW" sz="6400" b="1" dirty="0">
+                <a:solidFill>
+                  <a:srgbClr val="000066"/>
+                </a:solidFill>
+                <a:latin typeface="Microsoft JhengHei" panose="020B0604030504040204" pitchFamily="34" charset="-120"/>
+                <a:ea typeface="Microsoft JhengHei" panose="020B0604030504040204" pitchFamily="34" charset="-120"/>
+              </a:rPr>
+              <a:t>  </a:t>
+            </a:r>
+            <a:r>
+              <a:rPr lang="zh-TW" altLang="en-US" sz="6400" b="1" dirty="0">
+                <a:solidFill>
+                  <a:srgbClr val="000066"/>
+                </a:solidFill>
+                <a:latin typeface="Microsoft JhengHei" panose="020B0604030504040204" pitchFamily="34" charset="-120"/>
+                <a:ea typeface="Microsoft JhengHei" panose="020B0604030504040204" pitchFamily="34" charset="-120"/>
+              </a:rPr>
+              <a:t>世界的主</a:t>
+            </a:r>
+            <a:endParaRPr lang="vi-VN" sz="6400" b="1" dirty="0">
+              <a:solidFill>
+                <a:srgbClr val="000066"/>
+              </a:solidFill>
+              <a:latin typeface="Microsoft JhengHei" panose="020B0604030504040204" pitchFamily="34" charset="-120"/>
+              <a:ea typeface="Microsoft JhengHei" panose="020B0604030504040204" pitchFamily="34" charset="-120"/>
+            </a:endParaRPr>
+          </a:p>
+        </p:txBody>
+      </p:sp>
+    </p:spTree>
+    <p:extLst>
+      <p:ext uri="{BB962C8B-B14F-4D97-AF65-F5344CB8AC3E}">
+        <p14:creationId xmlns:p14="http://schemas.microsoft.com/office/powerpoint/2010/main" val="3371289720"/>
       </p:ext>
     </p:extLst>
   </p:cSld>

</xml_diff>